<commit_message>
vgpr usage test for 3125
</commit_message>
<xml_diff>
--- a/work_vgpr_4096/reduce vgpr.pptx
+++ b/work_vgpr_4096/reduce vgpr.pptx
@@ -5,10 +5,10 @@
     <p:sldMasterId id="2147483891" r:id="rId3"/>
   </p:sldMasterIdLst>
   <p:notesMasterIdLst>
-    <p:notesMasterId r:id="rId17"/>
+    <p:notesMasterId r:id="rId20"/>
   </p:notesMasterIdLst>
   <p:handoutMasterIdLst>
-    <p:handoutMasterId r:id="rId18"/>
+    <p:handoutMasterId r:id="rId21"/>
   </p:handoutMasterIdLst>
   <p:sldIdLst>
     <p:sldId id="2022" r:id="rId4"/>
@@ -21,9 +21,12 @@
     <p:sldId id="2039" r:id="rId11"/>
     <p:sldId id="2040" r:id="rId12"/>
     <p:sldId id="2041" r:id="rId13"/>
-    <p:sldId id="2033" r:id="rId14"/>
-    <p:sldId id="2029" r:id="rId15"/>
-    <p:sldId id="2032" r:id="rId16"/>
+    <p:sldId id="2042" r:id="rId14"/>
+    <p:sldId id="2044" r:id="rId15"/>
+    <p:sldId id="2043" r:id="rId16"/>
+    <p:sldId id="2033" r:id="rId17"/>
+    <p:sldId id="2029" r:id="rId18"/>
+    <p:sldId id="2032" r:id="rId19"/>
   </p:sldIdLst>
   <p:sldSz cx="12188825" cy="6858000"/>
   <p:notesSz cx="6858000" cy="4819650"/>
@@ -167,6 +170,9 @@
             <p14:sldId id="2039"/>
             <p14:sldId id="2040"/>
             <p14:sldId id="2041"/>
+            <p14:sldId id="2042"/>
+            <p14:sldId id="2044"/>
+            <p14:sldId id="2043"/>
             <p14:sldId id="2033"/>
             <p14:sldId id="2029"/>
             <p14:sldId id="2032"/>
@@ -349,7 +355,7 @@
               <a:pPr>
                 <a:defRPr/>
               </a:pPr>
-              <a:t>11/17/2020</a:t>
+              <a:t>11/19/2020</a:t>
             </a:fld>
             <a:endParaRPr lang="en-US"/>
           </a:p>
@@ -568,7 +574,7 @@
               <a:pPr>
                 <a:defRPr/>
               </a:pPr>
-              <a:t>11/17/2020</a:t>
+              <a:t>11/19/2020</a:t>
             </a:fld>
             <a:endParaRPr lang="en-US"/>
           </a:p>
@@ -1063,7 +1069,7 @@
               <a:pPr>
                 <a:defRPr/>
               </a:pPr>
-              <a:t>12</a:t>
+              <a:t>15</a:t>
             </a:fld>
             <a:endParaRPr lang="en-US"/>
           </a:p>
@@ -1153,7 +1159,7 @@
               <a:pPr>
                 <a:defRPr/>
               </a:pPr>
-              <a:t>13</a:t>
+              <a:t>16</a:t>
             </a:fld>
             <a:endParaRPr lang="en-US"/>
           </a:p>
@@ -3343,7 +3349,7 @@
           <a:graphicData uri="http://schemas.openxmlformats.org/presentationml/2006/ole">
             <mc:AlternateContent xmlns:mc="http://schemas.openxmlformats.org/markup-compatibility/2006">
               <mc:Choice xmlns:v="urn:schemas-microsoft-com:vml" Requires="v">
-                <p:oleObj spid="_x0000_s1431" name="Packager Shell Object" showAsIcon="1" r:id="rId6" imgW="473400" imgH="478800" progId="Package">
+                <p:oleObj spid="_x0000_s1464" name="Packager Shell Object" showAsIcon="1" r:id="rId6" imgW="473400" imgH="478800" progId="Package">
                   <p:embed/>
                 </p:oleObj>
               </mc:Choice>
@@ -3435,56 +3441,64 @@
           <a:lstStyle/>
           <a:p>
             <a:r>
+              <a:rPr lang="en-US" altLang="zh-CN" sz="2400" b="1" dirty="0">
+                <a:solidFill>
+                  <a:srgbClr val="FF0000"/>
+                </a:solidFill>
+              </a:rPr>
+              <a:t>Dangerous</a:t>
+            </a:r>
+            <a:r>
               <a:rPr lang="en-US" altLang="zh-CN" sz="2000" b="1" dirty="0">
                 <a:solidFill>
                   <a:srgbClr val="FF0000"/>
                 </a:solidFill>
               </a:rPr>
-              <a:t>Dangerous </a:t>
+              <a:t> </a:t>
             </a:r>
             <a:endParaRPr lang="en-US" altLang="zh-CN" sz="2000" dirty="0"/>
           </a:p>
           <a:p>
             <a:pPr lvl="1"/>
             <a:r>
-              <a:rPr lang="en-US" altLang="zh-CN" sz="1600" dirty="0"/>
+              <a:rPr lang="en-US" altLang="zh-CN" sz="2000" dirty="0"/>
               <a:t>If limit the </a:t>
             </a:r>
             <a:r>
-              <a:rPr lang="en-US" altLang="zh-CN" sz="1600" dirty="0" err="1"/>
+              <a:rPr lang="en-US" altLang="zh-CN" sz="2000" dirty="0" err="1"/>
               <a:t>vgpr</a:t>
             </a:r>
             <a:r>
-              <a:rPr lang="en-US" altLang="zh-CN" sz="1600" dirty="0"/>
+              <a:rPr lang="en-US" altLang="zh-CN" sz="2000" dirty="0"/>
               <a:t> to a not reasonable small number,</a:t>
             </a:r>
           </a:p>
           <a:p>
             <a:pPr lvl="1"/>
             <a:r>
-              <a:rPr lang="en-US" altLang="zh-CN" sz="1600" dirty="0"/>
+              <a:rPr lang="en-US" altLang="zh-CN" sz="2000" dirty="0"/>
               <a:t>the compiler won’t have enough </a:t>
             </a:r>
             <a:r>
-              <a:rPr lang="en-US" altLang="zh-CN" sz="1600" dirty="0" err="1"/>
+              <a:rPr lang="en-US" altLang="zh-CN" sz="2000" dirty="0" err="1"/>
               <a:t>vgprs</a:t>
             </a:r>
             <a:r>
-              <a:rPr lang="en-US" altLang="zh-CN" sz="1600" dirty="0"/>
+              <a:rPr lang="en-US" altLang="zh-CN" sz="2000" dirty="0"/>
               <a:t> to do it’s work, it will use scratch buffer.</a:t>
             </a:r>
           </a:p>
           <a:p>
             <a:pPr lvl="1"/>
             <a:r>
-              <a:rPr lang="en-US" altLang="zh-CN" sz="1600" dirty="0"/>
+              <a:rPr lang="en-US" altLang="zh-CN" sz="2000" dirty="0"/>
               <a:t>That will generate numbers of global memory read/write instructions</a:t>
             </a:r>
           </a:p>
           <a:p>
             <a:pPr lvl="1"/>
             <a:r>
-              <a:rPr lang="en-US" altLang="zh-CN" sz="1600" dirty="0"/>
+              <a:rPr lang="en-US" altLang="zh-CN" sz="2000" dirty="0"/>
               <a:t>Cause sharply perf-drop </a:t>
             </a:r>
           </a:p>
@@ -3613,6 +3627,1254 @@
 </file>
 
 <file path=ppt/slides/slide11.xml><?xml version="1.0" encoding="utf-8"?>
+<p:sld xmlns:a="http://schemas.openxmlformats.org/drawingml/2006/main" xmlns:r="http://schemas.openxmlformats.org/officeDocument/2006/relationships" xmlns:p="http://schemas.openxmlformats.org/presentationml/2006/main">
+  <p:cSld>
+    <p:spTree>
+      <p:nvGrpSpPr>
+        <p:cNvPr id="1" name=""/>
+        <p:cNvGrpSpPr/>
+        <p:nvPr/>
+      </p:nvGrpSpPr>
+      <p:grpSpPr>
+        <a:xfrm>
+          <a:off x="0" y="0"/>
+          <a:ext cx="0" cy="0"/>
+          <a:chOff x="0" y="0"/>
+          <a:chExt cx="0" cy="0"/>
+        </a:xfrm>
+      </p:grpSpPr>
+      <p:sp>
+        <p:nvSpPr>
+          <p:cNvPr id="2" name="Content Placeholder 1">
+            <a:extLst>
+              <a:ext uri="{FF2B5EF4-FFF2-40B4-BE49-F238E27FC236}">
+                <a16:creationId xmlns:a16="http://schemas.microsoft.com/office/drawing/2014/main" id="{62F0C778-32F6-4750-AA9D-CF74A2AD5ADD}"/>
+              </a:ext>
+            </a:extLst>
+          </p:cNvPr>
+          <p:cNvSpPr>
+            <a:spLocks noGrp="1"/>
+          </p:cNvSpPr>
+          <p:nvPr>
+            <p:ph idx="1"/>
+          </p:nvPr>
+        </p:nvSpPr>
+        <p:spPr>
+          <a:xfrm>
+            <a:off x="313244" y="1038224"/>
+            <a:ext cx="11609299" cy="3201032"/>
+          </a:xfrm>
+        </p:spPr>
+        <p:txBody>
+          <a:bodyPr/>
+          <a:lstStyle/>
+          <a:p>
+            <a:r>
+              <a:rPr lang="en-US" altLang="zh-CN" sz="2400" b="1" dirty="0">
+                <a:solidFill>
+                  <a:srgbClr val="FF0000"/>
+                </a:solidFill>
+              </a:rPr>
+              <a:t>DANGEROUS</a:t>
+            </a:r>
+            <a:endParaRPr lang="en-US" altLang="zh-CN" sz="2800" b="1" dirty="0">
+              <a:solidFill>
+                <a:srgbClr val="FF0000"/>
+              </a:solidFill>
+            </a:endParaRPr>
+          </a:p>
+          <a:p>
+            <a:pPr lvl="1"/>
+            <a:r>
+              <a:rPr lang="en-US" altLang="zh-CN" sz="2000" dirty="0"/>
+              <a:t>FFT: length = 3125, dim = 1d, c2c forward, batch size = 300, iteration = 1000</a:t>
+            </a:r>
+          </a:p>
+          <a:p>
+            <a:pPr lvl="1"/>
+            <a:r>
+              <a:rPr lang="en-US" altLang="zh-CN" sz="2000" dirty="0"/>
+              <a:t>GPU: 60 CU</a:t>
+            </a:r>
+          </a:p>
+          <a:p>
+            <a:pPr lvl="1"/>
+            <a:r>
+              <a:rPr lang="en-US" altLang="zh-CN" sz="2000" dirty="0"/>
+              <a:t>Workload: group size = 125(2 wave), group num = 300, LDS usage = 3125 DW (5 groups per CU at most)</a:t>
+            </a:r>
+          </a:p>
+          <a:p>
+            <a:pPr lvl="1"/>
+            <a:r>
+              <a:rPr lang="en-US" altLang="zh-CN" sz="2000" dirty="0"/>
+              <a:t>Origin:</a:t>
+            </a:r>
+            <a:r>
+              <a:rPr lang="zh-CN" altLang="en-US" sz="2000" dirty="0"/>
+              <a:t> </a:t>
+            </a:r>
+            <a:r>
+              <a:rPr lang="en-US" altLang="zh-CN" sz="2000" dirty="0"/>
+              <a:t>VGPR = 120, parallel wave per SIMD = 2, parallel group per</a:t>
+            </a:r>
+            <a:r>
+              <a:rPr lang="zh-CN" altLang="en-US" sz="2000" dirty="0"/>
+              <a:t> </a:t>
+            </a:r>
+            <a:r>
+              <a:rPr lang="en-US" altLang="zh-CN" sz="2000" dirty="0"/>
+              <a:t>CU</a:t>
+            </a:r>
+            <a:r>
+              <a:rPr lang="zh-CN" altLang="en-US" sz="2000" dirty="0"/>
+              <a:t> </a:t>
+            </a:r>
+            <a:r>
+              <a:rPr lang="en-US" altLang="zh-CN" sz="2000" dirty="0"/>
+              <a:t>= 4, dispatch number = 2</a:t>
+            </a:r>
+          </a:p>
+          <a:p>
+            <a:pPr lvl="1"/>
+            <a:r>
+              <a:rPr lang="en-US" altLang="zh-CN" sz="2000" dirty="0"/>
+              <a:t>Limit  : VGPR = 84,   parallel wave per SIMD = 3, parallel group per CU = 5, dispatch number = 1</a:t>
+            </a:r>
+          </a:p>
+          <a:p>
+            <a:pPr lvl="1"/>
+            <a:r>
+              <a:rPr lang="en-US" altLang="zh-CN" sz="2000" dirty="0"/>
+              <a:t>Performance drop: duration from 0.064ms to 0.144ms </a:t>
+            </a:r>
+          </a:p>
+        </p:txBody>
+      </p:sp>
+      <p:sp>
+        <p:nvSpPr>
+          <p:cNvPr id="3" name="Title 2">
+            <a:extLst>
+              <a:ext uri="{FF2B5EF4-FFF2-40B4-BE49-F238E27FC236}">
+                <a16:creationId xmlns:a16="http://schemas.microsoft.com/office/drawing/2014/main" id="{CEDC0840-5118-4BFD-899F-D50C1A686498}"/>
+              </a:ext>
+            </a:extLst>
+          </p:cNvPr>
+          <p:cNvSpPr>
+            <a:spLocks noGrp="1"/>
+          </p:cNvSpPr>
+          <p:nvPr>
+            <p:ph type="title"/>
+          </p:nvPr>
+        </p:nvSpPr>
+        <p:spPr/>
+        <p:txBody>
+          <a:bodyPr/>
+          <a:lstStyle/>
+          <a:p>
+            <a:r>
+              <a:rPr lang="en-US" altLang="zh-CN" dirty="0"/>
+              <a:t>Weekly </a:t>
+            </a:r>
+            <a:endParaRPr lang="en-US" dirty="0"/>
+          </a:p>
+        </p:txBody>
+      </p:sp>
+      <p:sp>
+        <p:nvSpPr>
+          <p:cNvPr id="4" name="Text Placeholder 3">
+            <a:extLst>
+              <a:ext uri="{FF2B5EF4-FFF2-40B4-BE49-F238E27FC236}">
+                <a16:creationId xmlns:a16="http://schemas.microsoft.com/office/drawing/2014/main" id="{23BC3E91-3C7D-4DD3-9DC0-25A44DC2381D}"/>
+              </a:ext>
+            </a:extLst>
+          </p:cNvPr>
+          <p:cNvSpPr>
+            <a:spLocks noGrp="1"/>
+          </p:cNvSpPr>
+          <p:nvPr>
+            <p:ph type="body" sz="quarter" idx="10"/>
+          </p:nvPr>
+        </p:nvSpPr>
+        <p:spPr/>
+        <p:txBody>
+          <a:bodyPr/>
+          <a:lstStyle/>
+          <a:p>
+            <a:r>
+              <a:rPr lang="en-US" dirty="0"/>
+              <a:t>Solution 2</a:t>
+            </a:r>
+          </a:p>
+        </p:txBody>
+      </p:sp>
+    </p:spTree>
+    <p:extLst>
+      <p:ext uri="{BB962C8B-B14F-4D97-AF65-F5344CB8AC3E}">
+        <p14:creationId xmlns:p14="http://schemas.microsoft.com/office/powerpoint/2010/main" val="322286095"/>
+      </p:ext>
+    </p:extLst>
+  </p:cSld>
+  <p:clrMapOvr>
+    <a:masterClrMapping/>
+  </p:clrMapOvr>
+</p:sld>
+</file>
+
+<file path=ppt/slides/slide12.xml><?xml version="1.0" encoding="utf-8"?>
+<p:sld xmlns:a="http://schemas.openxmlformats.org/drawingml/2006/main" xmlns:r="http://schemas.openxmlformats.org/officeDocument/2006/relationships" xmlns:p="http://schemas.openxmlformats.org/presentationml/2006/main">
+  <p:cSld>
+    <p:spTree>
+      <p:nvGrpSpPr>
+        <p:cNvPr id="1" name=""/>
+        <p:cNvGrpSpPr/>
+        <p:nvPr/>
+      </p:nvGrpSpPr>
+      <p:grpSpPr>
+        <a:xfrm>
+          <a:off x="0" y="0"/>
+          <a:ext cx="0" cy="0"/>
+          <a:chOff x="0" y="0"/>
+          <a:chExt cx="0" cy="0"/>
+        </a:xfrm>
+      </p:grpSpPr>
+      <p:sp>
+        <p:nvSpPr>
+          <p:cNvPr id="2" name="Content Placeholder 1">
+            <a:extLst>
+              <a:ext uri="{FF2B5EF4-FFF2-40B4-BE49-F238E27FC236}">
+                <a16:creationId xmlns:a16="http://schemas.microsoft.com/office/drawing/2014/main" id="{62F0C778-32F6-4750-AA9D-CF74A2AD5ADD}"/>
+              </a:ext>
+            </a:extLst>
+          </p:cNvPr>
+          <p:cNvSpPr>
+            <a:spLocks noGrp="1"/>
+          </p:cNvSpPr>
+          <p:nvPr>
+            <p:ph idx="1"/>
+          </p:nvPr>
+        </p:nvSpPr>
+        <p:spPr>
+          <a:xfrm>
+            <a:off x="313244" y="1038224"/>
+            <a:ext cx="11609299" cy="962026"/>
+          </a:xfrm>
+        </p:spPr>
+        <p:txBody>
+          <a:bodyPr/>
+          <a:lstStyle/>
+          <a:p>
+            <a:r>
+              <a:rPr lang="en-US" altLang="zh-CN" sz="2400" b="1" dirty="0">
+                <a:solidFill>
+                  <a:srgbClr val="FF0000"/>
+                </a:solidFill>
+              </a:rPr>
+              <a:t>DANGEROUS</a:t>
+            </a:r>
+            <a:endParaRPr lang="en-US" altLang="zh-CN" sz="2800" b="1" dirty="0">
+              <a:solidFill>
+                <a:srgbClr val="FF0000"/>
+              </a:solidFill>
+            </a:endParaRPr>
+          </a:p>
+          <a:p>
+            <a:pPr lvl="1"/>
+            <a:r>
+              <a:rPr lang="en-US" altLang="zh-CN" sz="2000" dirty="0"/>
+              <a:t>FFT: length = 3125, dim = 1d, c2c forward, batch size = 300, iteration = 1000</a:t>
+            </a:r>
+          </a:p>
+        </p:txBody>
+      </p:sp>
+      <p:sp>
+        <p:nvSpPr>
+          <p:cNvPr id="3" name="Title 2">
+            <a:extLst>
+              <a:ext uri="{FF2B5EF4-FFF2-40B4-BE49-F238E27FC236}">
+                <a16:creationId xmlns:a16="http://schemas.microsoft.com/office/drawing/2014/main" id="{CEDC0840-5118-4BFD-899F-D50C1A686498}"/>
+              </a:ext>
+            </a:extLst>
+          </p:cNvPr>
+          <p:cNvSpPr>
+            <a:spLocks noGrp="1"/>
+          </p:cNvSpPr>
+          <p:nvPr>
+            <p:ph type="title"/>
+          </p:nvPr>
+        </p:nvSpPr>
+        <p:spPr/>
+        <p:txBody>
+          <a:bodyPr/>
+          <a:lstStyle/>
+          <a:p>
+            <a:r>
+              <a:rPr lang="en-US" altLang="zh-CN" dirty="0"/>
+              <a:t>Weekly </a:t>
+            </a:r>
+            <a:endParaRPr lang="en-US" dirty="0"/>
+          </a:p>
+        </p:txBody>
+      </p:sp>
+      <p:sp>
+        <p:nvSpPr>
+          <p:cNvPr id="4" name="Text Placeholder 3">
+            <a:extLst>
+              <a:ext uri="{FF2B5EF4-FFF2-40B4-BE49-F238E27FC236}">
+                <a16:creationId xmlns:a16="http://schemas.microsoft.com/office/drawing/2014/main" id="{23BC3E91-3C7D-4DD3-9DC0-25A44DC2381D}"/>
+              </a:ext>
+            </a:extLst>
+          </p:cNvPr>
+          <p:cNvSpPr>
+            <a:spLocks noGrp="1"/>
+          </p:cNvSpPr>
+          <p:nvPr>
+            <p:ph type="body" sz="quarter" idx="10"/>
+          </p:nvPr>
+        </p:nvSpPr>
+        <p:spPr/>
+        <p:txBody>
+          <a:bodyPr/>
+          <a:lstStyle/>
+          <a:p>
+            <a:r>
+              <a:rPr lang="en-US" dirty="0"/>
+              <a:t>Solution 2</a:t>
+            </a:r>
+          </a:p>
+        </p:txBody>
+      </p:sp>
+      <p:pic>
+        <p:nvPicPr>
+          <p:cNvPr id="7" name="Picture 6">
+            <a:extLst>
+              <a:ext uri="{FF2B5EF4-FFF2-40B4-BE49-F238E27FC236}">
+                <a16:creationId xmlns:a16="http://schemas.microsoft.com/office/drawing/2014/main" id="{C7F56876-ED0B-4826-9AD2-3899049360DF}"/>
+              </a:ext>
+            </a:extLst>
+          </p:cNvPr>
+          <p:cNvPicPr>
+            <a:picLocks noChangeAspect="1"/>
+          </p:cNvPicPr>
+          <p:nvPr/>
+        </p:nvPicPr>
+        <p:blipFill rotWithShape="1">
+          <a:blip r:embed="rId2"/>
+          <a:srcRect t="55522"/>
+          <a:stretch/>
+        </p:blipFill>
+        <p:spPr>
+          <a:xfrm>
+            <a:off x="192092" y="4411729"/>
+            <a:ext cx="11995766" cy="2327409"/>
+          </a:xfrm>
+          <a:prstGeom prst="rect">
+            <a:avLst/>
+          </a:prstGeom>
+        </p:spPr>
+      </p:pic>
+      <p:pic>
+        <p:nvPicPr>
+          <p:cNvPr id="9" name="Picture 8">
+            <a:extLst>
+              <a:ext uri="{FF2B5EF4-FFF2-40B4-BE49-F238E27FC236}">
+                <a16:creationId xmlns:a16="http://schemas.microsoft.com/office/drawing/2014/main" id="{EB6FE548-0143-4E94-BD97-D079CE5B3A83}"/>
+              </a:ext>
+            </a:extLst>
+          </p:cNvPr>
+          <p:cNvPicPr>
+            <a:picLocks noChangeAspect="1"/>
+          </p:cNvPicPr>
+          <p:nvPr/>
+        </p:nvPicPr>
+        <p:blipFill rotWithShape="1">
+          <a:blip r:embed="rId3"/>
+          <a:srcRect t="55304"/>
+          <a:stretch/>
+        </p:blipFill>
+        <p:spPr>
+          <a:xfrm>
+            <a:off x="199409" y="2000250"/>
+            <a:ext cx="11989416" cy="2327409"/>
+          </a:xfrm>
+          <a:prstGeom prst="rect">
+            <a:avLst/>
+          </a:prstGeom>
+        </p:spPr>
+      </p:pic>
+      <p:sp>
+        <p:nvSpPr>
+          <p:cNvPr id="5" name="Rectangle 4">
+            <a:extLst>
+              <a:ext uri="{FF2B5EF4-FFF2-40B4-BE49-F238E27FC236}">
+                <a16:creationId xmlns:a16="http://schemas.microsoft.com/office/drawing/2014/main" id="{1B09E1D0-EFC5-47E8-81BE-9F7D788C9394}"/>
+              </a:ext>
+            </a:extLst>
+          </p:cNvPr>
+          <p:cNvSpPr/>
+          <p:nvPr/>
+        </p:nvSpPr>
+        <p:spPr>
+          <a:xfrm>
+            <a:off x="305624" y="2520952"/>
+            <a:ext cx="1524000" cy="643002"/>
+          </a:xfrm>
+          <a:prstGeom prst="rect">
+            <a:avLst/>
+          </a:prstGeom>
+          <a:noFill/>
+          <a:ln>
+            <a:noFill/>
+          </a:ln>
+          <a:effectLst/>
+        </p:spPr>
+        <p:style>
+          <a:lnRef idx="2">
+            <a:schemeClr val="accent1">
+              <a:shade val="50000"/>
+            </a:schemeClr>
+          </a:lnRef>
+          <a:fillRef idx="1">
+            <a:schemeClr val="accent1"/>
+          </a:fillRef>
+          <a:effectRef idx="0">
+            <a:schemeClr val="accent1"/>
+          </a:effectRef>
+          <a:fontRef idx="minor">
+            <a:schemeClr val="lt1"/>
+          </a:fontRef>
+        </p:style>
+        <p:txBody>
+          <a:bodyPr rtlCol="0" anchor="ctr"/>
+          <a:lstStyle/>
+          <a:p>
+            <a:pPr algn="ctr"/>
+            <a:r>
+              <a:rPr lang="en-US" sz="2800" b="1" dirty="0">
+                <a:solidFill>
+                  <a:srgbClr val="FF0000"/>
+                </a:solidFill>
+              </a:rPr>
+              <a:t>84 VGPR</a:t>
+            </a:r>
+          </a:p>
+        </p:txBody>
+      </p:sp>
+      <p:sp>
+        <p:nvSpPr>
+          <p:cNvPr id="10" name="Rectangle 9">
+            <a:extLst>
+              <a:ext uri="{FF2B5EF4-FFF2-40B4-BE49-F238E27FC236}">
+                <a16:creationId xmlns:a16="http://schemas.microsoft.com/office/drawing/2014/main" id="{8A6D130C-4FFA-47D5-A09A-20F01726F728}"/>
+              </a:ext>
+            </a:extLst>
+          </p:cNvPr>
+          <p:cNvSpPr/>
+          <p:nvPr/>
+        </p:nvSpPr>
+        <p:spPr>
+          <a:xfrm>
+            <a:off x="192092" y="4968184"/>
+            <a:ext cx="1637532" cy="643002"/>
+          </a:xfrm>
+          <a:prstGeom prst="rect">
+            <a:avLst/>
+          </a:prstGeom>
+          <a:noFill/>
+          <a:ln>
+            <a:noFill/>
+          </a:ln>
+          <a:effectLst/>
+        </p:spPr>
+        <p:style>
+          <a:lnRef idx="2">
+            <a:schemeClr val="accent1">
+              <a:shade val="50000"/>
+            </a:schemeClr>
+          </a:lnRef>
+          <a:fillRef idx="1">
+            <a:schemeClr val="accent1"/>
+          </a:fillRef>
+          <a:effectRef idx="0">
+            <a:schemeClr val="accent1"/>
+          </a:effectRef>
+          <a:fontRef idx="minor">
+            <a:schemeClr val="lt1"/>
+          </a:fontRef>
+        </p:style>
+        <p:txBody>
+          <a:bodyPr rtlCol="0" anchor="ctr"/>
+          <a:lstStyle/>
+          <a:p>
+            <a:pPr algn="ctr"/>
+            <a:r>
+              <a:rPr lang="en-US" sz="2800" b="1" dirty="0">
+                <a:solidFill>
+                  <a:srgbClr val="FF0000"/>
+                </a:solidFill>
+              </a:rPr>
+              <a:t>120 VGPR</a:t>
+            </a:r>
+          </a:p>
+        </p:txBody>
+      </p:sp>
+      <p:grpSp>
+        <p:nvGrpSpPr>
+          <p:cNvPr id="11" name="Group 10">
+            <a:extLst>
+              <a:ext uri="{FF2B5EF4-FFF2-40B4-BE49-F238E27FC236}">
+                <a16:creationId xmlns:a16="http://schemas.microsoft.com/office/drawing/2014/main" id="{80013095-0BCE-4628-BFB0-F09C8EAFDC2B}"/>
+              </a:ext>
+            </a:extLst>
+          </p:cNvPr>
+          <p:cNvGrpSpPr/>
+          <p:nvPr/>
+        </p:nvGrpSpPr>
+        <p:grpSpPr>
+          <a:xfrm>
+            <a:off x="9071280" y="5479717"/>
+            <a:ext cx="3450895" cy="1080167"/>
+            <a:chOff x="8499780" y="7037768"/>
+            <a:chExt cx="3450895" cy="1080167"/>
+          </a:xfrm>
+        </p:grpSpPr>
+        <p:cxnSp>
+          <p:nvCxnSpPr>
+            <p:cNvPr id="12" name="Straight Arrow Connector 11">
+              <a:extLst>
+                <a:ext uri="{FF2B5EF4-FFF2-40B4-BE49-F238E27FC236}">
+                  <a16:creationId xmlns:a16="http://schemas.microsoft.com/office/drawing/2014/main" id="{0DCA8BE6-8FCC-41C5-B712-5079729E0744}"/>
+                </a:ext>
+              </a:extLst>
+            </p:cNvPr>
+            <p:cNvCxnSpPr>
+              <a:cxnSpLocks/>
+            </p:cNvCxnSpPr>
+            <p:nvPr/>
+          </p:nvCxnSpPr>
+          <p:spPr>
+            <a:xfrm flipV="1">
+              <a:off x="10134600" y="7037768"/>
+              <a:ext cx="0" cy="544132"/>
+            </a:xfrm>
+            <a:prstGeom prst="straightConnector1">
+              <a:avLst/>
+            </a:prstGeom>
+            <a:ln w="76200">
+              <a:solidFill>
+                <a:srgbClr val="FF0000"/>
+              </a:solidFill>
+              <a:tailEnd type="triangle"/>
+            </a:ln>
+          </p:spPr>
+          <p:style>
+            <a:lnRef idx="1">
+              <a:schemeClr val="accent1"/>
+            </a:lnRef>
+            <a:fillRef idx="0">
+              <a:schemeClr val="accent1"/>
+            </a:fillRef>
+            <a:effectRef idx="0">
+              <a:schemeClr val="accent1"/>
+            </a:effectRef>
+            <a:fontRef idx="minor">
+              <a:schemeClr val="tx1"/>
+            </a:fontRef>
+          </p:style>
+        </p:cxnSp>
+        <p:sp>
+          <p:nvSpPr>
+            <p:cNvPr id="13" name="Rectangle 12">
+              <a:extLst>
+                <a:ext uri="{FF2B5EF4-FFF2-40B4-BE49-F238E27FC236}">
+                  <a16:creationId xmlns:a16="http://schemas.microsoft.com/office/drawing/2014/main" id="{712FA9B2-3D19-4784-9E09-F51E4D60C823}"/>
+                </a:ext>
+              </a:extLst>
+            </p:cNvPr>
+            <p:cNvSpPr/>
+            <p:nvPr/>
+          </p:nvSpPr>
+          <p:spPr>
+            <a:xfrm>
+              <a:off x="8499780" y="7474933"/>
+              <a:ext cx="3450895" cy="643002"/>
+            </a:xfrm>
+            <a:prstGeom prst="rect">
+              <a:avLst/>
+            </a:prstGeom>
+            <a:noFill/>
+            <a:ln>
+              <a:noFill/>
+            </a:ln>
+            <a:effectLst/>
+          </p:spPr>
+          <p:style>
+            <a:lnRef idx="2">
+              <a:schemeClr val="accent1">
+                <a:shade val="50000"/>
+              </a:schemeClr>
+            </a:lnRef>
+            <a:fillRef idx="1">
+              <a:schemeClr val="accent1"/>
+            </a:fillRef>
+            <a:effectRef idx="0">
+              <a:schemeClr val="accent1"/>
+            </a:effectRef>
+            <a:fontRef idx="minor">
+              <a:schemeClr val="lt1"/>
+            </a:fontRef>
+          </p:style>
+          <p:txBody>
+            <a:bodyPr rtlCol="0" anchor="ctr"/>
+            <a:lstStyle/>
+            <a:p>
+              <a:pPr algn="ctr"/>
+              <a:r>
+                <a:rPr lang="en-US" sz="2800" dirty="0">
+                  <a:solidFill>
+                    <a:srgbClr val="70FF5D"/>
+                  </a:solidFill>
+                </a:rPr>
+                <a:t>second dispatch</a:t>
+              </a:r>
+            </a:p>
+          </p:txBody>
+        </p:sp>
+      </p:grpSp>
+    </p:spTree>
+    <p:extLst>
+      <p:ext uri="{BB962C8B-B14F-4D97-AF65-F5344CB8AC3E}">
+        <p14:creationId xmlns:p14="http://schemas.microsoft.com/office/powerpoint/2010/main" val="2016301279"/>
+      </p:ext>
+    </p:extLst>
+  </p:cSld>
+  <p:clrMapOvr>
+    <a:masterClrMapping/>
+  </p:clrMapOvr>
+</p:sld>
+</file>
+
+<file path=ppt/slides/slide13.xml><?xml version="1.0" encoding="utf-8"?>
+<p:sld xmlns:a="http://schemas.openxmlformats.org/drawingml/2006/main" xmlns:r="http://schemas.openxmlformats.org/officeDocument/2006/relationships" xmlns:p="http://schemas.openxmlformats.org/presentationml/2006/main">
+  <p:cSld>
+    <p:spTree>
+      <p:nvGrpSpPr>
+        <p:cNvPr id="1" name=""/>
+        <p:cNvGrpSpPr/>
+        <p:nvPr/>
+      </p:nvGrpSpPr>
+      <p:grpSpPr>
+        <a:xfrm>
+          <a:off x="0" y="0"/>
+          <a:ext cx="0" cy="0"/>
+          <a:chOff x="0" y="0"/>
+          <a:chExt cx="0" cy="0"/>
+        </a:xfrm>
+      </p:grpSpPr>
+      <p:sp>
+        <p:nvSpPr>
+          <p:cNvPr id="2" name="Content Placeholder 1">
+            <a:extLst>
+              <a:ext uri="{FF2B5EF4-FFF2-40B4-BE49-F238E27FC236}">
+                <a16:creationId xmlns:a16="http://schemas.microsoft.com/office/drawing/2014/main" id="{62F0C778-32F6-4750-AA9D-CF74A2AD5ADD}"/>
+              </a:ext>
+            </a:extLst>
+          </p:cNvPr>
+          <p:cNvSpPr>
+            <a:spLocks noGrp="1"/>
+          </p:cNvSpPr>
+          <p:nvPr>
+            <p:ph idx="1"/>
+          </p:nvPr>
+        </p:nvSpPr>
+        <p:spPr>
+          <a:xfrm>
+            <a:off x="313244" y="1038224"/>
+            <a:ext cx="11609299" cy="962026"/>
+          </a:xfrm>
+        </p:spPr>
+        <p:txBody>
+          <a:bodyPr/>
+          <a:lstStyle/>
+          <a:p>
+            <a:r>
+              <a:rPr lang="en-US" altLang="zh-CN" sz="2400" b="1" dirty="0">
+                <a:solidFill>
+                  <a:srgbClr val="FF0000"/>
+                </a:solidFill>
+              </a:rPr>
+              <a:t>DANGEROUS</a:t>
+            </a:r>
+            <a:endParaRPr lang="en-US" altLang="zh-CN" sz="2800" b="1" dirty="0">
+              <a:solidFill>
+                <a:srgbClr val="FF0000"/>
+              </a:solidFill>
+            </a:endParaRPr>
+          </a:p>
+          <a:p>
+            <a:pPr lvl="1"/>
+            <a:r>
+              <a:rPr lang="en-US" altLang="zh-CN" sz="2000" dirty="0"/>
+              <a:t>FFT: length = 3125, dim = 1d, c2c forward, batch size = 300, iteration = 1000</a:t>
+            </a:r>
+          </a:p>
+        </p:txBody>
+      </p:sp>
+      <p:sp>
+        <p:nvSpPr>
+          <p:cNvPr id="3" name="Title 2">
+            <a:extLst>
+              <a:ext uri="{FF2B5EF4-FFF2-40B4-BE49-F238E27FC236}">
+                <a16:creationId xmlns:a16="http://schemas.microsoft.com/office/drawing/2014/main" id="{CEDC0840-5118-4BFD-899F-D50C1A686498}"/>
+              </a:ext>
+            </a:extLst>
+          </p:cNvPr>
+          <p:cNvSpPr>
+            <a:spLocks noGrp="1"/>
+          </p:cNvSpPr>
+          <p:nvPr>
+            <p:ph type="title"/>
+          </p:nvPr>
+        </p:nvSpPr>
+        <p:spPr/>
+        <p:txBody>
+          <a:bodyPr/>
+          <a:lstStyle/>
+          <a:p>
+            <a:r>
+              <a:rPr lang="en-US" altLang="zh-CN" dirty="0"/>
+              <a:t>Weekly </a:t>
+            </a:r>
+            <a:endParaRPr lang="en-US" dirty="0"/>
+          </a:p>
+        </p:txBody>
+      </p:sp>
+      <p:sp>
+        <p:nvSpPr>
+          <p:cNvPr id="4" name="Text Placeholder 3">
+            <a:extLst>
+              <a:ext uri="{FF2B5EF4-FFF2-40B4-BE49-F238E27FC236}">
+                <a16:creationId xmlns:a16="http://schemas.microsoft.com/office/drawing/2014/main" id="{23BC3E91-3C7D-4DD3-9DC0-25A44DC2381D}"/>
+              </a:ext>
+            </a:extLst>
+          </p:cNvPr>
+          <p:cNvSpPr>
+            <a:spLocks noGrp="1"/>
+          </p:cNvSpPr>
+          <p:nvPr>
+            <p:ph type="body" sz="quarter" idx="10"/>
+          </p:nvPr>
+        </p:nvSpPr>
+        <p:spPr/>
+        <p:txBody>
+          <a:bodyPr/>
+          <a:lstStyle/>
+          <a:p>
+            <a:r>
+              <a:rPr lang="en-US" dirty="0"/>
+              <a:t>Solution 2</a:t>
+            </a:r>
+          </a:p>
+        </p:txBody>
+      </p:sp>
+      <p:pic>
+        <p:nvPicPr>
+          <p:cNvPr id="7" name="Picture 6">
+            <a:extLst>
+              <a:ext uri="{FF2B5EF4-FFF2-40B4-BE49-F238E27FC236}">
+                <a16:creationId xmlns:a16="http://schemas.microsoft.com/office/drawing/2014/main" id="{C7F56876-ED0B-4826-9AD2-3899049360DF}"/>
+              </a:ext>
+            </a:extLst>
+          </p:cNvPr>
+          <p:cNvPicPr>
+            <a:picLocks noChangeAspect="1"/>
+          </p:cNvPicPr>
+          <p:nvPr/>
+        </p:nvPicPr>
+        <p:blipFill rotWithShape="1">
+          <a:blip r:embed="rId2"/>
+          <a:srcRect t="1824" b="45176"/>
+          <a:stretch/>
+        </p:blipFill>
+        <p:spPr>
+          <a:xfrm>
+            <a:off x="193059" y="4570414"/>
+            <a:ext cx="11995766" cy="2773362"/>
+          </a:xfrm>
+          <a:prstGeom prst="rect">
+            <a:avLst/>
+          </a:prstGeom>
+        </p:spPr>
+      </p:pic>
+      <p:pic>
+        <p:nvPicPr>
+          <p:cNvPr id="9" name="Picture 8">
+            <a:extLst>
+              <a:ext uri="{FF2B5EF4-FFF2-40B4-BE49-F238E27FC236}">
+                <a16:creationId xmlns:a16="http://schemas.microsoft.com/office/drawing/2014/main" id="{EB6FE548-0143-4E94-BD97-D079CE5B3A83}"/>
+              </a:ext>
+            </a:extLst>
+          </p:cNvPr>
+          <p:cNvPicPr>
+            <a:picLocks noChangeAspect="1"/>
+          </p:cNvPicPr>
+          <p:nvPr/>
+        </p:nvPicPr>
+        <p:blipFill rotWithShape="1">
+          <a:blip r:embed="rId3"/>
+          <a:srcRect t="826" b="45914"/>
+          <a:stretch/>
+        </p:blipFill>
+        <p:spPr>
+          <a:xfrm>
+            <a:off x="199409" y="1846264"/>
+            <a:ext cx="11989416" cy="2773361"/>
+          </a:xfrm>
+          <a:prstGeom prst="rect">
+            <a:avLst/>
+          </a:prstGeom>
+        </p:spPr>
+      </p:pic>
+      <p:sp>
+        <p:nvSpPr>
+          <p:cNvPr id="5" name="Rectangle 4">
+            <a:extLst>
+              <a:ext uri="{FF2B5EF4-FFF2-40B4-BE49-F238E27FC236}">
+                <a16:creationId xmlns:a16="http://schemas.microsoft.com/office/drawing/2014/main" id="{76C61E41-F274-41F0-A991-C6B6FEEDC68E}"/>
+              </a:ext>
+            </a:extLst>
+          </p:cNvPr>
+          <p:cNvSpPr/>
+          <p:nvPr/>
+        </p:nvSpPr>
+        <p:spPr>
+          <a:xfrm>
+            <a:off x="193059" y="2679637"/>
+            <a:ext cx="1524000" cy="643002"/>
+          </a:xfrm>
+          <a:prstGeom prst="rect">
+            <a:avLst/>
+          </a:prstGeom>
+          <a:noFill/>
+          <a:ln>
+            <a:noFill/>
+          </a:ln>
+          <a:effectLst/>
+        </p:spPr>
+        <p:style>
+          <a:lnRef idx="2">
+            <a:schemeClr val="accent1">
+              <a:shade val="50000"/>
+            </a:schemeClr>
+          </a:lnRef>
+          <a:fillRef idx="1">
+            <a:schemeClr val="accent1"/>
+          </a:fillRef>
+          <a:effectRef idx="0">
+            <a:schemeClr val="accent1"/>
+          </a:effectRef>
+          <a:fontRef idx="minor">
+            <a:schemeClr val="lt1"/>
+          </a:fontRef>
+        </p:style>
+        <p:txBody>
+          <a:bodyPr rtlCol="0" anchor="ctr"/>
+          <a:lstStyle/>
+          <a:p>
+            <a:pPr algn="ctr"/>
+            <a:r>
+              <a:rPr lang="en-US" sz="2800" b="1" dirty="0">
+                <a:solidFill>
+                  <a:srgbClr val="FF0000"/>
+                </a:solidFill>
+              </a:rPr>
+              <a:t>84 VGPR</a:t>
+            </a:r>
+          </a:p>
+        </p:txBody>
+      </p:sp>
+      <p:sp>
+        <p:nvSpPr>
+          <p:cNvPr id="6" name="Rectangle 5">
+            <a:extLst>
+              <a:ext uri="{FF2B5EF4-FFF2-40B4-BE49-F238E27FC236}">
+                <a16:creationId xmlns:a16="http://schemas.microsoft.com/office/drawing/2014/main" id="{45A5E3AC-D08F-437D-9CFF-35388967DF4C}"/>
+              </a:ext>
+            </a:extLst>
+          </p:cNvPr>
+          <p:cNvSpPr/>
+          <p:nvPr/>
+        </p:nvSpPr>
+        <p:spPr>
+          <a:xfrm>
+            <a:off x="193059" y="5452998"/>
+            <a:ext cx="1637532" cy="643002"/>
+          </a:xfrm>
+          <a:prstGeom prst="rect">
+            <a:avLst/>
+          </a:prstGeom>
+          <a:noFill/>
+          <a:ln>
+            <a:noFill/>
+          </a:ln>
+          <a:effectLst/>
+        </p:spPr>
+        <p:style>
+          <a:lnRef idx="2">
+            <a:schemeClr val="accent1">
+              <a:shade val="50000"/>
+            </a:schemeClr>
+          </a:lnRef>
+          <a:fillRef idx="1">
+            <a:schemeClr val="accent1"/>
+          </a:fillRef>
+          <a:effectRef idx="0">
+            <a:schemeClr val="accent1"/>
+          </a:effectRef>
+          <a:fontRef idx="minor">
+            <a:schemeClr val="lt1"/>
+          </a:fontRef>
+        </p:style>
+        <p:txBody>
+          <a:bodyPr rtlCol="0" anchor="ctr"/>
+          <a:lstStyle/>
+          <a:p>
+            <a:pPr algn="ctr"/>
+            <a:r>
+              <a:rPr lang="en-US" sz="2800" b="1" dirty="0">
+                <a:solidFill>
+                  <a:srgbClr val="FF0000"/>
+                </a:solidFill>
+              </a:rPr>
+              <a:t>120 VGPR</a:t>
+            </a:r>
+          </a:p>
+        </p:txBody>
+      </p:sp>
+      <p:cxnSp>
+        <p:nvCxnSpPr>
+          <p:cNvPr id="12" name="Straight Arrow Connector 11">
+            <a:extLst>
+              <a:ext uri="{FF2B5EF4-FFF2-40B4-BE49-F238E27FC236}">
+                <a16:creationId xmlns:a16="http://schemas.microsoft.com/office/drawing/2014/main" id="{6B2DD6B4-F6CC-449A-B544-FC705B9B68E4}"/>
+              </a:ext>
+            </a:extLst>
+          </p:cNvPr>
+          <p:cNvCxnSpPr/>
+          <p:nvPr/>
+        </p:nvCxnSpPr>
+        <p:spPr>
+          <a:xfrm flipV="1">
+            <a:off x="5076825" y="3429000"/>
+            <a:ext cx="0" cy="323850"/>
+          </a:xfrm>
+          <a:prstGeom prst="straightConnector1">
+            <a:avLst/>
+          </a:prstGeom>
+          <a:ln w="28575">
+            <a:solidFill>
+              <a:srgbClr val="FF0000"/>
+            </a:solidFill>
+            <a:tailEnd type="triangle"/>
+          </a:ln>
+        </p:spPr>
+        <p:style>
+          <a:lnRef idx="1">
+            <a:schemeClr val="accent1"/>
+          </a:lnRef>
+          <a:fillRef idx="0">
+            <a:schemeClr val="accent1"/>
+          </a:fillRef>
+          <a:effectRef idx="0">
+            <a:schemeClr val="accent1"/>
+          </a:effectRef>
+          <a:fontRef idx="minor">
+            <a:schemeClr val="tx1"/>
+          </a:fontRef>
+        </p:style>
+      </p:cxnSp>
+      <p:cxnSp>
+        <p:nvCxnSpPr>
+          <p:cNvPr id="13" name="Straight Arrow Connector 12">
+            <a:extLst>
+              <a:ext uri="{FF2B5EF4-FFF2-40B4-BE49-F238E27FC236}">
+                <a16:creationId xmlns:a16="http://schemas.microsoft.com/office/drawing/2014/main" id="{CE4BB054-E490-4F35-8A1E-BDAF1EAA3619}"/>
+              </a:ext>
+            </a:extLst>
+          </p:cNvPr>
+          <p:cNvCxnSpPr/>
+          <p:nvPr/>
+        </p:nvCxnSpPr>
+        <p:spPr>
+          <a:xfrm flipV="1">
+            <a:off x="5295900" y="3429000"/>
+            <a:ext cx="0" cy="323850"/>
+          </a:xfrm>
+          <a:prstGeom prst="straightConnector1">
+            <a:avLst/>
+          </a:prstGeom>
+          <a:ln w="28575">
+            <a:solidFill>
+              <a:srgbClr val="FF0000"/>
+            </a:solidFill>
+            <a:tailEnd type="triangle"/>
+          </a:ln>
+        </p:spPr>
+        <p:style>
+          <a:lnRef idx="1">
+            <a:schemeClr val="accent1"/>
+          </a:lnRef>
+          <a:fillRef idx="0">
+            <a:schemeClr val="accent1"/>
+          </a:fillRef>
+          <a:effectRef idx="0">
+            <a:schemeClr val="accent1"/>
+          </a:effectRef>
+          <a:fontRef idx="minor">
+            <a:schemeClr val="tx1"/>
+          </a:fontRef>
+        </p:style>
+      </p:cxnSp>
+      <p:cxnSp>
+        <p:nvCxnSpPr>
+          <p:cNvPr id="14" name="Straight Arrow Connector 13">
+            <a:extLst>
+              <a:ext uri="{FF2B5EF4-FFF2-40B4-BE49-F238E27FC236}">
+                <a16:creationId xmlns:a16="http://schemas.microsoft.com/office/drawing/2014/main" id="{F5C72E61-6F02-43E5-9263-679075F3D887}"/>
+              </a:ext>
+            </a:extLst>
+          </p:cNvPr>
+          <p:cNvCxnSpPr/>
+          <p:nvPr/>
+        </p:nvCxnSpPr>
+        <p:spPr>
+          <a:xfrm flipV="1">
+            <a:off x="4305300" y="3429000"/>
+            <a:ext cx="0" cy="323850"/>
+          </a:xfrm>
+          <a:prstGeom prst="straightConnector1">
+            <a:avLst/>
+          </a:prstGeom>
+          <a:ln w="28575">
+            <a:solidFill>
+              <a:srgbClr val="FF0000"/>
+            </a:solidFill>
+            <a:tailEnd type="triangle"/>
+          </a:ln>
+        </p:spPr>
+        <p:style>
+          <a:lnRef idx="1">
+            <a:schemeClr val="accent1"/>
+          </a:lnRef>
+          <a:fillRef idx="0">
+            <a:schemeClr val="accent1"/>
+          </a:fillRef>
+          <a:effectRef idx="0">
+            <a:schemeClr val="accent1"/>
+          </a:effectRef>
+          <a:fontRef idx="minor">
+            <a:schemeClr val="tx1"/>
+          </a:fontRef>
+        </p:style>
+      </p:cxnSp>
+      <p:cxnSp>
+        <p:nvCxnSpPr>
+          <p:cNvPr id="15" name="Straight Arrow Connector 14">
+            <a:extLst>
+              <a:ext uri="{FF2B5EF4-FFF2-40B4-BE49-F238E27FC236}">
+                <a16:creationId xmlns:a16="http://schemas.microsoft.com/office/drawing/2014/main" id="{0C0BC5A8-B776-4147-86FC-54EFE3CCE96C}"/>
+              </a:ext>
+            </a:extLst>
+          </p:cNvPr>
+          <p:cNvCxnSpPr/>
+          <p:nvPr/>
+        </p:nvCxnSpPr>
+        <p:spPr>
+          <a:xfrm flipV="1">
+            <a:off x="3781425" y="3429000"/>
+            <a:ext cx="0" cy="323850"/>
+          </a:xfrm>
+          <a:prstGeom prst="straightConnector1">
+            <a:avLst/>
+          </a:prstGeom>
+          <a:ln w="28575">
+            <a:solidFill>
+              <a:srgbClr val="FF0000"/>
+            </a:solidFill>
+            <a:tailEnd type="triangle"/>
+          </a:ln>
+        </p:spPr>
+        <p:style>
+          <a:lnRef idx="1">
+            <a:schemeClr val="accent1"/>
+          </a:lnRef>
+          <a:fillRef idx="0">
+            <a:schemeClr val="accent1"/>
+          </a:fillRef>
+          <a:effectRef idx="0">
+            <a:schemeClr val="accent1"/>
+          </a:effectRef>
+          <a:fontRef idx="minor">
+            <a:schemeClr val="tx1"/>
+          </a:fontRef>
+        </p:style>
+      </p:cxnSp>
+      <p:cxnSp>
+        <p:nvCxnSpPr>
+          <p:cNvPr id="16" name="Straight Arrow Connector 15">
+            <a:extLst>
+              <a:ext uri="{FF2B5EF4-FFF2-40B4-BE49-F238E27FC236}">
+                <a16:creationId xmlns:a16="http://schemas.microsoft.com/office/drawing/2014/main" id="{A63E1128-63D7-4FAB-9B10-0D00752703AF}"/>
+              </a:ext>
+            </a:extLst>
+          </p:cNvPr>
+          <p:cNvCxnSpPr/>
+          <p:nvPr/>
+        </p:nvCxnSpPr>
+        <p:spPr>
+          <a:xfrm flipV="1">
+            <a:off x="5800725" y="3429000"/>
+            <a:ext cx="0" cy="323850"/>
+          </a:xfrm>
+          <a:prstGeom prst="straightConnector1">
+            <a:avLst/>
+          </a:prstGeom>
+          <a:ln w="28575">
+            <a:solidFill>
+              <a:srgbClr val="FF0000"/>
+            </a:solidFill>
+            <a:tailEnd type="triangle"/>
+          </a:ln>
+        </p:spPr>
+        <p:style>
+          <a:lnRef idx="1">
+            <a:schemeClr val="accent1"/>
+          </a:lnRef>
+          <a:fillRef idx="0">
+            <a:schemeClr val="accent1"/>
+          </a:fillRef>
+          <a:effectRef idx="0">
+            <a:schemeClr val="accent1"/>
+          </a:effectRef>
+          <a:fontRef idx="minor">
+            <a:schemeClr val="tx1"/>
+          </a:fontRef>
+        </p:style>
+      </p:cxnSp>
+      <p:cxnSp>
+        <p:nvCxnSpPr>
+          <p:cNvPr id="17" name="Straight Arrow Connector 16">
+            <a:extLst>
+              <a:ext uri="{FF2B5EF4-FFF2-40B4-BE49-F238E27FC236}">
+                <a16:creationId xmlns:a16="http://schemas.microsoft.com/office/drawing/2014/main" id="{85523309-4823-4154-B600-EB842AD5CAAF}"/>
+              </a:ext>
+            </a:extLst>
+          </p:cNvPr>
+          <p:cNvCxnSpPr/>
+          <p:nvPr/>
+        </p:nvCxnSpPr>
+        <p:spPr>
+          <a:xfrm flipV="1">
+            <a:off x="7686675" y="3429000"/>
+            <a:ext cx="0" cy="323850"/>
+          </a:xfrm>
+          <a:prstGeom prst="straightConnector1">
+            <a:avLst/>
+          </a:prstGeom>
+          <a:ln w="28575">
+            <a:solidFill>
+              <a:srgbClr val="FF0000"/>
+            </a:solidFill>
+            <a:tailEnd type="triangle"/>
+          </a:ln>
+        </p:spPr>
+        <p:style>
+          <a:lnRef idx="1">
+            <a:schemeClr val="accent1"/>
+          </a:lnRef>
+          <a:fillRef idx="0">
+            <a:schemeClr val="accent1"/>
+          </a:fillRef>
+          <a:effectRef idx="0">
+            <a:schemeClr val="accent1"/>
+          </a:effectRef>
+          <a:fontRef idx="minor">
+            <a:schemeClr val="tx1"/>
+          </a:fontRef>
+        </p:style>
+      </p:cxnSp>
+      <p:sp>
+        <p:nvSpPr>
+          <p:cNvPr id="19" name="Rectangle 18">
+            <a:extLst>
+              <a:ext uri="{FF2B5EF4-FFF2-40B4-BE49-F238E27FC236}">
+                <a16:creationId xmlns:a16="http://schemas.microsoft.com/office/drawing/2014/main" id="{6356CE8A-A0CB-4421-8A2D-F6E26B848422}"/>
+              </a:ext>
+            </a:extLst>
+          </p:cNvPr>
+          <p:cNvSpPr/>
+          <p:nvPr/>
+        </p:nvSpPr>
+        <p:spPr>
+          <a:xfrm>
+            <a:off x="3184527" y="3608388"/>
+            <a:ext cx="3927474" cy="643002"/>
+          </a:xfrm>
+          <a:prstGeom prst="rect">
+            <a:avLst/>
+          </a:prstGeom>
+          <a:noFill/>
+          <a:ln>
+            <a:noFill/>
+          </a:ln>
+          <a:effectLst/>
+        </p:spPr>
+        <p:style>
+          <a:lnRef idx="2">
+            <a:schemeClr val="accent1">
+              <a:shade val="50000"/>
+            </a:schemeClr>
+          </a:lnRef>
+          <a:fillRef idx="1">
+            <a:schemeClr val="accent1"/>
+          </a:fillRef>
+          <a:effectRef idx="0">
+            <a:schemeClr val="accent1"/>
+          </a:effectRef>
+          <a:fontRef idx="minor">
+            <a:schemeClr val="lt1"/>
+          </a:fontRef>
+        </p:style>
+        <p:txBody>
+          <a:bodyPr rtlCol="0" anchor="ctr"/>
+          <a:lstStyle/>
+          <a:p>
+            <a:pPr algn="ctr"/>
+            <a:r>
+              <a:rPr lang="en-US" sz="2800" dirty="0">
+                <a:solidFill>
+                  <a:srgbClr val="00B0F0"/>
+                </a:solidFill>
+              </a:rPr>
+              <a:t>scratch memory access</a:t>
+            </a:r>
+          </a:p>
+        </p:txBody>
+      </p:sp>
+    </p:spTree>
+    <p:extLst>
+      <p:ext uri="{BB962C8B-B14F-4D97-AF65-F5344CB8AC3E}">
+        <p14:creationId xmlns:p14="http://schemas.microsoft.com/office/powerpoint/2010/main" val="854714607"/>
+      </p:ext>
+    </p:extLst>
+  </p:cSld>
+  <p:clrMapOvr>
+    <a:masterClrMapping/>
+  </p:clrMapOvr>
+</p:sld>
+</file>
+
+<file path=ppt/slides/slide14.xml><?xml version="1.0" encoding="utf-8"?>
 <p:sld xmlns:a="http://schemas.openxmlformats.org/drawingml/2006/main" xmlns:r="http://schemas.openxmlformats.org/officeDocument/2006/relationships" xmlns:p="http://schemas.openxmlformats.org/presentationml/2006/main">
   <p:cSld>
     <p:spTree>
@@ -4343,7 +5605,7 @@
 </p:sld>
 </file>
 
-<file path=ppt/slides/slide12.xml><?xml version="1.0" encoding="utf-8"?>
+<file path=ppt/slides/slide15.xml><?xml version="1.0" encoding="utf-8"?>
 <p:sld xmlns:a="http://schemas.openxmlformats.org/drawingml/2006/main" xmlns:r="http://schemas.openxmlformats.org/officeDocument/2006/relationships" xmlns:p="http://schemas.openxmlformats.org/presentationml/2006/main">
   <p:cSld>
     <p:spTree>
@@ -4678,108 +5940,129 @@
           </a:p>
         </p:txBody>
       </p:sp>
-      <p:cxnSp>
-        <p:nvCxnSpPr>
-          <p:cNvPr id="21" name="Straight Arrow Connector 20">
+      <p:grpSp>
+        <p:nvGrpSpPr>
+          <p:cNvPr id="2" name="Group 1">
             <a:extLst>
               <a:ext uri="{FF2B5EF4-FFF2-40B4-BE49-F238E27FC236}">
-                <a16:creationId xmlns:a16="http://schemas.microsoft.com/office/drawing/2014/main" id="{40A69337-1B1E-4033-BC71-9067501F5841}"/>
+                <a16:creationId xmlns:a16="http://schemas.microsoft.com/office/drawing/2014/main" id="{CE624DA5-3C08-458E-9844-15352CFD2911}"/>
               </a:ext>
             </a:extLst>
           </p:cNvPr>
-          <p:cNvCxnSpPr>
-            <a:cxnSpLocks/>
-          </p:cNvCxnSpPr>
+          <p:cNvGrpSpPr/>
           <p:nvPr/>
-        </p:nvCxnSpPr>
-        <p:spPr>
-          <a:xfrm flipV="1">
-            <a:off x="10134600" y="7037768"/>
-            <a:ext cx="0" cy="544132"/>
+        </p:nvGrpSpPr>
+        <p:grpSpPr>
+          <a:xfrm>
+            <a:off x="8499780" y="7037768"/>
+            <a:ext cx="3450895" cy="1080167"/>
+            <a:chOff x="8499780" y="7037768"/>
+            <a:chExt cx="3450895" cy="1080167"/>
           </a:xfrm>
-          <a:prstGeom prst="straightConnector1">
-            <a:avLst/>
-          </a:prstGeom>
-          <a:ln w="76200">
-            <a:solidFill>
-              <a:srgbClr val="FF0000"/>
-            </a:solidFill>
-            <a:tailEnd type="triangle"/>
-          </a:ln>
-        </p:spPr>
-        <p:style>
-          <a:lnRef idx="1">
-            <a:schemeClr val="accent1"/>
-          </a:lnRef>
-          <a:fillRef idx="0">
-            <a:schemeClr val="accent1"/>
-          </a:fillRef>
-          <a:effectRef idx="0">
-            <a:schemeClr val="accent1"/>
-          </a:effectRef>
-          <a:fontRef idx="minor">
-            <a:schemeClr val="tx1"/>
-          </a:fontRef>
-        </p:style>
-      </p:cxnSp>
-      <p:sp>
-        <p:nvSpPr>
-          <p:cNvPr id="23" name="Rectangle 22">
-            <a:extLst>
-              <a:ext uri="{FF2B5EF4-FFF2-40B4-BE49-F238E27FC236}">
-                <a16:creationId xmlns:a16="http://schemas.microsoft.com/office/drawing/2014/main" id="{6E505724-F69F-4E07-BDA0-F12D7B2182EE}"/>
-              </a:ext>
-            </a:extLst>
-          </p:cNvPr>
-          <p:cNvSpPr/>
-          <p:nvPr/>
-        </p:nvSpPr>
-        <p:spPr>
-          <a:xfrm>
-            <a:off x="8499780" y="7474933"/>
-            <a:ext cx="3450895" cy="643002"/>
-          </a:xfrm>
-          <a:prstGeom prst="rect">
-            <a:avLst/>
-          </a:prstGeom>
-          <a:noFill/>
-          <a:ln>
+        </p:grpSpPr>
+        <p:cxnSp>
+          <p:nvCxnSpPr>
+            <p:cNvPr id="21" name="Straight Arrow Connector 20">
+              <a:extLst>
+                <a:ext uri="{FF2B5EF4-FFF2-40B4-BE49-F238E27FC236}">
+                  <a16:creationId xmlns:a16="http://schemas.microsoft.com/office/drawing/2014/main" id="{40A69337-1B1E-4033-BC71-9067501F5841}"/>
+                </a:ext>
+              </a:extLst>
+            </p:cNvPr>
+            <p:cNvCxnSpPr>
+              <a:cxnSpLocks/>
+            </p:cNvCxnSpPr>
+            <p:nvPr/>
+          </p:nvCxnSpPr>
+          <p:spPr>
+            <a:xfrm flipV="1">
+              <a:off x="10134600" y="7037768"/>
+              <a:ext cx="0" cy="544132"/>
+            </a:xfrm>
+            <a:prstGeom prst="straightConnector1">
+              <a:avLst/>
+            </a:prstGeom>
+            <a:ln w="76200">
+              <a:solidFill>
+                <a:srgbClr val="FF0000"/>
+              </a:solidFill>
+              <a:tailEnd type="triangle"/>
+            </a:ln>
+          </p:spPr>
+          <p:style>
+            <a:lnRef idx="1">
+              <a:schemeClr val="accent1"/>
+            </a:lnRef>
+            <a:fillRef idx="0">
+              <a:schemeClr val="accent1"/>
+            </a:fillRef>
+            <a:effectRef idx="0">
+              <a:schemeClr val="accent1"/>
+            </a:effectRef>
+            <a:fontRef idx="minor">
+              <a:schemeClr val="tx1"/>
+            </a:fontRef>
+          </p:style>
+        </p:cxnSp>
+        <p:sp>
+          <p:nvSpPr>
+            <p:cNvPr id="23" name="Rectangle 22">
+              <a:extLst>
+                <a:ext uri="{FF2B5EF4-FFF2-40B4-BE49-F238E27FC236}">
+                  <a16:creationId xmlns:a16="http://schemas.microsoft.com/office/drawing/2014/main" id="{6E505724-F69F-4E07-BDA0-F12D7B2182EE}"/>
+                </a:ext>
+              </a:extLst>
+            </p:cNvPr>
+            <p:cNvSpPr/>
+            <p:nvPr/>
+          </p:nvSpPr>
+          <p:spPr>
+            <a:xfrm>
+              <a:off x="8499780" y="7474933"/>
+              <a:ext cx="3450895" cy="643002"/>
+            </a:xfrm>
+            <a:prstGeom prst="rect">
+              <a:avLst/>
+            </a:prstGeom>
             <a:noFill/>
-          </a:ln>
-          <a:effectLst/>
-        </p:spPr>
-        <p:style>
-          <a:lnRef idx="2">
-            <a:schemeClr val="accent1">
-              <a:shade val="50000"/>
-            </a:schemeClr>
-          </a:lnRef>
-          <a:fillRef idx="1">
-            <a:schemeClr val="accent1"/>
-          </a:fillRef>
-          <a:effectRef idx="0">
-            <a:schemeClr val="accent1"/>
-          </a:effectRef>
-          <a:fontRef idx="minor">
-            <a:schemeClr val="lt1"/>
-          </a:fontRef>
-        </p:style>
-        <p:txBody>
-          <a:bodyPr rtlCol="0" anchor="ctr"/>
-          <a:lstStyle/>
-          <a:p>
-            <a:pPr algn="ctr"/>
-            <a:r>
-              <a:rPr lang="en-US" sz="2800" dirty="0">
-                <a:solidFill>
-                  <a:srgbClr val="70FF5D"/>
-                </a:solidFill>
-              </a:rPr>
-              <a:t>second dispatch</a:t>
-            </a:r>
-          </a:p>
-        </p:txBody>
-      </p:sp>
+            <a:ln>
+              <a:noFill/>
+            </a:ln>
+            <a:effectLst/>
+          </p:spPr>
+          <p:style>
+            <a:lnRef idx="2">
+              <a:schemeClr val="accent1">
+                <a:shade val="50000"/>
+              </a:schemeClr>
+            </a:lnRef>
+            <a:fillRef idx="1">
+              <a:schemeClr val="accent1"/>
+            </a:fillRef>
+            <a:effectRef idx="0">
+              <a:schemeClr val="accent1"/>
+            </a:effectRef>
+            <a:fontRef idx="minor">
+              <a:schemeClr val="lt1"/>
+            </a:fontRef>
+          </p:style>
+          <p:txBody>
+            <a:bodyPr rtlCol="0" anchor="ctr"/>
+            <a:lstStyle/>
+            <a:p>
+              <a:pPr algn="ctr"/>
+              <a:r>
+                <a:rPr lang="en-US" sz="2800" dirty="0">
+                  <a:solidFill>
+                    <a:srgbClr val="70FF5D"/>
+                  </a:solidFill>
+                </a:rPr>
+                <a:t>second dispatch</a:t>
+              </a:r>
+            </a:p>
+          </p:txBody>
+        </p:sp>
+      </p:grpSp>
     </p:spTree>
     <p:extLst>
       <p:ext uri="{BB962C8B-B14F-4D97-AF65-F5344CB8AC3E}">
@@ -4793,7 +6076,7 @@
 </p:sld>
 </file>
 
-<file path=ppt/slides/slide13.xml><?xml version="1.0" encoding="utf-8"?>
+<file path=ppt/slides/slide16.xml><?xml version="1.0" encoding="utf-8"?>
 <p:sld xmlns:a="http://schemas.openxmlformats.org/drawingml/2006/main" xmlns:r="http://schemas.openxmlformats.org/officeDocument/2006/relationships" xmlns:p="http://schemas.openxmlformats.org/presentationml/2006/main">
   <p:cSld>
     <p:spTree>
@@ -5435,7 +6718,7 @@
           <p:nvPr>
             <p:extLst>
               <p:ext uri="{D42A27DB-BD31-4B8C-83A1-F6EECF244321}">
-                <p14:modId xmlns:p14="http://schemas.microsoft.com/office/powerpoint/2010/main" val="1790826777"/>
+                <p14:modId xmlns:p14="http://schemas.microsoft.com/office/powerpoint/2010/main" val="2615830480"/>
               </p:ext>
             </p:extLst>
           </p:nvPr>
@@ -6310,7 +7593,15 @@
                     <a:p>
                       <a:r>
                         <a:rPr lang="en-US" dirty="0"/>
-                        <a:t>85 </a:t>
+                        <a:t>8</a:t>
+                      </a:r>
+                      <a:r>
+                        <a:rPr lang="en-US" altLang="zh-CN" dirty="0"/>
+                        <a:t>4</a:t>
+                      </a:r>
+                      <a:r>
+                        <a:rPr lang="en-US" dirty="0"/>
+                        <a:t> </a:t>
                       </a:r>
                       <a:r>
                         <a:rPr lang="en-US" dirty="0">
@@ -10144,15 +11435,6 @@
 </file>
 
 <file path=customXml/item1.xml><?xml version="1.0" encoding="utf-8"?>
-<?mso-contentType ?>
-<FormTemplates xmlns="http://schemas.microsoft.com/sharepoint/v3/contenttype/forms">
-  <Display>DocumentLibraryForm</Display>
-  <Edit>DocumentLibraryForm</Edit>
-  <New>DocumentLibraryForm</New>
-</FormTemplates>
-</file>
-
-<file path=customXml/item2.xml><?xml version="1.0" encoding="utf-8"?>
 <ct:contentTypeSchema xmlns:ct="http://schemas.microsoft.com/office/2006/metadata/contentType" xmlns:ma="http://schemas.microsoft.com/office/2006/metadata/properties/metaAttributes" ct:_="" ma:_="" ma:contentTypeName="Document" ma:contentTypeID="0x010100B040F28C9190714F9051F1661A72B344" ma:contentTypeVersion="0" ma:contentTypeDescription="Create a new document." ma:contentTypeScope="" ma:versionID="b8b95d69f10381dae1e3fc8aa097d9b2">
   <xsd:schema xmlns:xsd="http://www.w3.org/2001/XMLSchema" xmlns:xs="http://www.w3.org/2001/XMLSchema" xmlns:p="http://schemas.microsoft.com/office/2006/metadata/properties" targetNamespace="http://schemas.microsoft.com/office/2006/metadata/properties" ma:root="true" ma:fieldsID="1b05d82d297216baf5b26c55225140df">
     <xsd:element name="properties">
@@ -10266,15 +11548,16 @@
 </ct:contentTypeSchema>
 </file>
 
-<file path=customXml/itemProps1.xml><?xml version="1.0" encoding="utf-8"?>
-<ds:datastoreItem xmlns:ds="http://schemas.openxmlformats.org/officeDocument/2006/customXml" ds:itemID="{46C7C7BA-398C-443C-9325-A8C61CE3C0A0}">
-  <ds:schemaRefs>
-    <ds:schemaRef ds:uri="http://schemas.microsoft.com/sharepoint/v3/contenttype/forms"/>
-  </ds:schemaRefs>
-</ds:datastoreItem>
+<file path=customXml/item2.xml><?xml version="1.0" encoding="utf-8"?>
+<?mso-contentType ?>
+<FormTemplates xmlns="http://schemas.microsoft.com/sharepoint/v3/contenttype/forms">
+  <Display>DocumentLibraryForm</Display>
+  <Edit>DocumentLibraryForm</Edit>
+  <New>DocumentLibraryForm</New>
+</FormTemplates>
 </file>
 
-<file path=customXml/itemProps2.xml><?xml version="1.0" encoding="utf-8"?>
+<file path=customXml/itemProps1.xml><?xml version="1.0" encoding="utf-8"?>
 <ds:datastoreItem xmlns:ds="http://schemas.openxmlformats.org/officeDocument/2006/customXml" ds:itemID="{CB9B9DAE-0203-490A-8CF8-6A331C5A0B02}">
   <ds:schemaRefs>
     <ds:schemaRef ds:uri="http://schemas.microsoft.com/office/2006/metadata/contentType"/>
@@ -10288,4 +11571,12 @@
     <ds:schemaRef ds:uri="http://schemas.microsoft.com/office/infopath/2007/PartnerControls"/>
   </ds:schemaRefs>
 </ds:datastoreItem>
+</file>
+
+<file path=customXml/itemProps2.xml><?xml version="1.0" encoding="utf-8"?>
+<ds:datastoreItem xmlns:ds="http://schemas.openxmlformats.org/officeDocument/2006/customXml" ds:itemID="{46C7C7BA-398C-443C-9325-A8C61CE3C0A0}">
+  <ds:schemaRefs>
+    <ds:schemaRef ds:uri="http://schemas.microsoft.com/sharepoint/v3/contenttype/forms"/>
+  </ds:schemaRefs>
+</ds:datastoreItem>
 </file>
</xml_diff>